<commit_message>
capital or lowercase y?
</commit_message>
<xml_diff>
--- a/images/workflow.pptx
+++ b/images/workflow.pptx
@@ -3103,7 +3103,7 @@
         </p:nvSpPr>
         <p:spPr>
           <a:xfrm>
-            <a:off x="1825809" y="579236"/>
+            <a:off x="1825809" y="748998"/>
             <a:ext cx="1718235" cy="646331"/>
           </a:xfrm>
           <a:prstGeom prst="rect">
@@ -3134,7 +3134,7 @@
         </p:nvSpPr>
         <p:spPr>
           <a:xfrm>
-            <a:off x="4198471" y="907013"/>
+            <a:off x="5167649" y="890296"/>
             <a:ext cx="1090706" cy="369332"/>
           </a:xfrm>
           <a:prstGeom prst="rect">
@@ -3264,7 +3264,7 @@
         </p:blipFill>
         <p:spPr>
           <a:xfrm>
-            <a:off x="0" y="166399"/>
+            <a:off x="0" y="600106"/>
             <a:ext cx="2091765" cy="1886216"/>
           </a:xfrm>
           <a:prstGeom prst="rect">
@@ -3288,7 +3288,7 @@
           </a:prstGeom>
           <a:ln w="28575" cmpd="sng">
             <a:solidFill>
-              <a:srgbClr val="263DC3"/>
+              <a:srgbClr val="3366FF"/>
             </a:solidFill>
             <a:tailEnd type="arrow"/>
           </a:ln>
@@ -3303,43 +3303,6 @@
           </a:fillRef>
           <a:effectRef idx="1">
             <a:schemeClr val="accent2"/>
-          </a:effectRef>
-          <a:fontRef idx="minor">
-            <a:schemeClr val="tx1"/>
-          </a:fontRef>
-        </p:style>
-      </p:cxnSp>
-      <p:cxnSp>
-        <p:nvCxnSpPr>
-          <p:cNvPr id="14" name="Straight Arrow Connector 13"/>
-          <p:cNvCxnSpPr/>
-          <p:nvPr/>
-        </p:nvCxnSpPr>
-        <p:spPr>
-          <a:xfrm>
-            <a:off x="5064727" y="1409549"/>
-            <a:ext cx="493391" cy="807791"/>
-          </a:xfrm>
-          <a:prstGeom prst="straightConnector1">
-            <a:avLst/>
-          </a:prstGeom>
-          <a:ln w="28575" cmpd="sng">
-            <a:solidFill>
-              <a:srgbClr val="A60101"/>
-            </a:solidFill>
-            <a:tailEnd type="arrow"/>
-          </a:ln>
-          <a:effectLst/>
-        </p:spPr>
-        <p:style>
-          <a:lnRef idx="2">
-            <a:schemeClr val="accent1"/>
-          </a:lnRef>
-          <a:fillRef idx="0">
-            <a:schemeClr val="accent1"/>
-          </a:fillRef>
-          <a:effectRef idx="1">
-            <a:schemeClr val="accent1"/>
           </a:effectRef>
           <a:fontRef idx="minor">
             <a:schemeClr val="tx1"/>
@@ -3429,7 +3392,7 @@
           </a:prstGeom>
           <a:ln w="28575" cmpd="sng">
             <a:solidFill>
-              <a:srgbClr val="263DC3"/>
+              <a:srgbClr val="3366FF"/>
             </a:solidFill>
             <a:tailEnd type="arrow"/>
           </a:ln>
@@ -3535,74 +3498,6 @@
           </a:prstGeom>
         </p:spPr>
       </p:pic>
-      <p:sp>
-        <p:nvSpPr>
-          <p:cNvPr id="43" name="TextBox 42"/>
-          <p:cNvSpPr txBox="1"/>
-          <p:nvPr/>
-        </p:nvSpPr>
-        <p:spPr>
-          <a:xfrm>
-            <a:off x="5963057" y="705871"/>
-            <a:ext cx="2028989" cy="646331"/>
-          </a:xfrm>
-          <a:prstGeom prst="rect">
-            <a:avLst/>
-          </a:prstGeom>
-          <a:noFill/>
-        </p:spPr>
-        <p:txBody>
-          <a:bodyPr wrap="square" rtlCol="0">
-            <a:spAutoFit/>
-          </a:bodyPr>
-          <a:lstStyle/>
-          <a:p>
-            <a:pPr algn="ctr"/>
-            <a:r>
-              <a:rPr lang="en-US" dirty="0" smtClean="0"/>
-              <a:t>ESTIMATED COEFFICIENTS</a:t>
-            </a:r>
-            <a:endParaRPr lang="en-US" dirty="0"/>
-          </a:p>
-        </p:txBody>
-      </p:sp>
-      <p:cxnSp>
-        <p:nvCxnSpPr>
-          <p:cNvPr id="45" name="Straight Arrow Connector 44"/>
-          <p:cNvCxnSpPr/>
-          <p:nvPr/>
-        </p:nvCxnSpPr>
-        <p:spPr>
-          <a:xfrm>
-            <a:off x="3630706" y="902402"/>
-            <a:ext cx="2383527" cy="0"/>
-          </a:xfrm>
-          <a:prstGeom prst="straightConnector1">
-            <a:avLst/>
-          </a:prstGeom>
-          <a:ln w="28575" cmpd="sng">
-            <a:solidFill>
-              <a:srgbClr val="263DC3"/>
-            </a:solidFill>
-            <a:tailEnd type="arrow"/>
-          </a:ln>
-          <a:effectLst/>
-        </p:spPr>
-        <p:style>
-          <a:lnRef idx="2">
-            <a:schemeClr val="accent1"/>
-          </a:lnRef>
-          <a:fillRef idx="0">
-            <a:schemeClr val="accent1"/>
-          </a:fillRef>
-          <a:effectRef idx="1">
-            <a:schemeClr val="accent1"/>
-          </a:effectRef>
-          <a:fontRef idx="minor">
-            <a:schemeClr val="tx1"/>
-          </a:fontRef>
-        </p:style>
-      </p:cxnSp>
       <p:cxnSp>
         <p:nvCxnSpPr>
           <p:cNvPr id="48" name="Straight Arrow Connector 47"/>
@@ -3610,48 +3505,9 @@
           <p:nvPr/>
         </p:nvCxnSpPr>
         <p:spPr>
-          <a:xfrm flipH="1">
-            <a:off x="5963057" y="1409549"/>
-            <a:ext cx="409858" cy="807791"/>
-          </a:xfrm>
-          <a:prstGeom prst="straightConnector1">
-            <a:avLst/>
-          </a:prstGeom>
-          <a:ln w="28575" cmpd="sng">
-            <a:solidFill>
-              <a:srgbClr val="A60101"/>
-            </a:solidFill>
-            <a:tailEnd type="arrow"/>
-          </a:ln>
-          <a:effectLst/>
-        </p:spPr>
-        <p:style>
-          <a:lnRef idx="2">
-            <a:schemeClr val="accent1"/>
-          </a:lnRef>
-          <a:fillRef idx="0">
-            <a:schemeClr val="accent1"/>
-          </a:fillRef>
-          <a:effectRef idx="1">
-            <a:schemeClr val="accent1"/>
-          </a:effectRef>
-          <a:fontRef idx="minor">
-            <a:schemeClr val="tx1"/>
-          </a:fontRef>
-        </p:style>
-      </p:cxnSp>
-      <p:cxnSp>
-        <p:nvCxnSpPr>
-          <p:cNvPr id="54" name="Straight Arrow Connector 53"/>
-          <p:cNvCxnSpPr>
-            <a:stCxn id="5" idx="3"/>
-          </p:cNvCxnSpPr>
-          <p:nvPr/>
-        </p:nvCxnSpPr>
-        <p:spPr>
           <a:xfrm>
-            <a:off x="5289177" y="1091679"/>
-            <a:ext cx="725056" cy="0"/>
+            <a:off x="5713002" y="1409549"/>
+            <a:ext cx="0" cy="807791"/>
           </a:xfrm>
           <a:prstGeom prst="straightConnector1">
             <a:avLst/>
@@ -3681,7 +3537,7 @@
       </p:cxnSp>
       <p:pic>
         <p:nvPicPr>
-          <p:cNvPr id="83" name="Picture 82"/>
+          <p:cNvPr id="99" name="Picture 98"/>
           <p:cNvPicPr>
             <a:picLocks noChangeAspect="1"/>
           </p:cNvPicPr>
@@ -3695,8 +3551,8 @@
         </p:blipFill>
         <p:spPr>
           <a:xfrm>
-            <a:off x="7731860" y="519390"/>
-            <a:ext cx="1223348" cy="1126449"/>
+            <a:off x="6798969" y="2217340"/>
+            <a:ext cx="1790700" cy="469900"/>
           </a:xfrm>
           <a:prstGeom prst="rect">
             <a:avLst/>
@@ -3705,69 +3561,22 @@
       </p:pic>
       <p:pic>
         <p:nvPicPr>
-          <p:cNvPr id="86" name="Picture 85"/>
-          <p:cNvPicPr>
-            <a:picLocks noChangeAspect="1"/>
-          </p:cNvPicPr>
-          <p:nvPr/>
-        </p:nvPicPr>
-        <p:blipFill rotWithShape="1">
-          <a:blip r:embed="rId6"/>
-          <a:srcRect l="-1462" t="17709" r="1462" b="86"/>
-          <a:stretch/>
-        </p:blipFill>
-        <p:spPr>
-          <a:xfrm>
-            <a:off x="925776" y="4979380"/>
-            <a:ext cx="6545389" cy="1691640"/>
-          </a:xfrm>
-          <a:prstGeom prst="rect">
-            <a:avLst/>
-          </a:prstGeom>
-        </p:spPr>
-      </p:pic>
-      <p:pic>
-        <p:nvPicPr>
-          <p:cNvPr id="94" name="Picture 93"/>
+          <p:cNvPr id="100" name="Picture 99"/>
           <p:cNvPicPr>
             <a:picLocks noChangeAspect="1"/>
           </p:cNvPicPr>
           <p:nvPr/>
         </p:nvPicPr>
         <p:blipFill>
-          <a:blip r:embed="rId7"/>
+          <a:blip r:embed="rId6"/>
           <a:stretch>
             <a:fillRect/>
           </a:stretch>
         </p:blipFill>
         <p:spPr>
           <a:xfrm>
-            <a:off x="6595154" y="2217340"/>
-            <a:ext cx="2360054" cy="529160"/>
-          </a:xfrm>
-          <a:prstGeom prst="rect">
-            <a:avLst/>
-          </a:prstGeom>
-        </p:spPr>
-      </p:pic>
-      <p:pic>
-        <p:nvPicPr>
-          <p:cNvPr id="95" name="Picture 94"/>
-          <p:cNvPicPr>
-            <a:picLocks noChangeAspect="1"/>
-          </p:cNvPicPr>
-          <p:nvPr/>
-        </p:nvPicPr>
-        <p:blipFill>
-          <a:blip r:embed="rId8"/>
-          <a:stretch>
-            <a:fillRect/>
-          </a:stretch>
-        </p:blipFill>
-        <p:spPr>
-          <a:xfrm>
-            <a:off x="3822312" y="519390"/>
-            <a:ext cx="1890690" cy="311763"/>
+            <a:off x="6798969" y="890296"/>
+            <a:ext cx="2108200" cy="457200"/>
           </a:xfrm>
           <a:prstGeom prst="rect">
             <a:avLst/>

</xml_diff>